<commit_message>
[Presentazione] Continua inserimento materiale
</commit_message>
<xml_diff>
--- a/RQ/Esterni/Presentazione/RQ-Presentazione.pptx
+++ b/RQ/Esterni/Presentazione/RQ-Presentazione.pptx
@@ -5,17 +5,20 @@
     <p:sldMasterId id="2147483732" r:id="rId1"/>
   </p:sldMasterIdLst>
   <p:notesMasterIdLst>
-    <p:notesMasterId r:id="rId5"/>
+    <p:notesMasterId r:id="rId8"/>
   </p:notesMasterIdLst>
   <p:sldIdLst>
     <p:sldId id="256" r:id="rId2"/>
     <p:sldId id="289" r:id="rId3"/>
     <p:sldId id="290" r:id="rId4"/>
+    <p:sldId id="291" r:id="rId5"/>
+    <p:sldId id="293" r:id="rId6"/>
+    <p:sldId id="292" r:id="rId7"/>
   </p:sldIdLst>
   <p:sldSz cx="9144000" cy="6858000" type="screen4x3"/>
   <p:notesSz cx="6858000" cy="9144000"/>
   <p:custDataLst>
-    <p:tags r:id="rId6"/>
+    <p:tags r:id="rId9"/>
   </p:custDataLst>
   <p:defaultTextStyle>
     <a:defPPr>
@@ -124,12 +127,255 @@
         <p14:section name="Architettura generale" id="{A3DFFC98-60C1-471E-8596-AD357C71C8EB}">
           <p14:sldIdLst>
             <p14:sldId id="290"/>
+            <p14:sldId id="291"/>
+          </p14:sldIdLst>
+        </p14:section>
+        <p14:section name="Fase test" id="{8357C3EB-2135-4199-93ED-79403AB00DF0}">
+          <p14:sldIdLst/>
+        </p14:section>
+        <p14:section name="Consuntivo" id="{A815DC9A-4E1A-4215-B2F9-580B6BAA931F}">
+          <p14:sldIdLst>
+            <p14:sldId id="293"/>
+            <p14:sldId id="292"/>
           </p14:sldIdLst>
         </p14:section>
       </p14:sectionLst>
     </p:ext>
   </p:extLst>
 </p:presentation>
+</file>
+
+<file path=ppt/charts/chart1.xml><?xml version="1.0" encoding="utf-8"?>
+<c:chartSpace xmlns:c="http://schemas.openxmlformats.org/drawingml/2006/chart" xmlns:a="http://schemas.openxmlformats.org/drawingml/2006/main" xmlns:r="http://schemas.openxmlformats.org/officeDocument/2006/relationships">
+  <c:date1904 val="0"/>
+  <c:lang val="it-IT"/>
+  <c:roundedCorners val="0"/>
+  <mc:AlternateContent xmlns:mc="http://schemas.openxmlformats.org/markup-compatibility/2006">
+    <mc:Choice xmlns:c14="http://schemas.microsoft.com/office/drawing/2007/8/2/chart" Requires="c14">
+      <c14:style val="102"/>
+    </mc:Choice>
+    <mc:Fallback>
+      <c:style val="2"/>
+    </mc:Fallback>
+  </mc:AlternateContent>
+  <c:chart>
+    <c:autoTitleDeleted val="0"/>
+    <c:view3D>
+      <c:rotX val="15"/>
+      <c:rotY val="20"/>
+      <c:rAngAx val="1"/>
+    </c:view3D>
+    <c:floor>
+      <c:thickness val="0"/>
+    </c:floor>
+    <c:sideWall>
+      <c:thickness val="0"/>
+    </c:sideWall>
+    <c:backWall>
+      <c:thickness val="0"/>
+    </c:backWall>
+    <c:plotArea>
+      <c:layout/>
+      <c:bar3DChart>
+        <c:barDir val="bar"/>
+        <c:grouping val="clustered"/>
+        <c:varyColors val="0"/>
+        <c:ser>
+          <c:idx val="0"/>
+          <c:order val="0"/>
+          <c:tx>
+            <c:v>Preventivo</c:v>
+          </c:tx>
+          <c:spPr>
+            <a:scene3d>
+              <a:camera prst="orthographicFront"/>
+              <a:lightRig rig="threePt" dir="t"/>
+            </a:scene3d>
+            <a:sp3d/>
+          </c:spPr>
+          <c:invertIfNegative val="0"/>
+          <c:dLbls>
+            <c:txPr>
+              <a:bodyPr/>
+              <a:lstStyle/>
+              <a:p>
+                <a:pPr>
+                  <a:defRPr u="none"/>
+                </a:pPr>
+                <a:endParaRPr lang="it-IT"/>
+              </a:p>
+            </c:txPr>
+            <c:showLegendKey val="0"/>
+            <c:showVal val="1"/>
+            <c:showCatName val="0"/>
+            <c:showSerName val="0"/>
+            <c:showPercent val="0"/>
+            <c:showBubbleSize val="0"/>
+            <c:showLeaderLines val="0"/>
+          </c:dLbls>
+          <c:cat>
+            <c:strLit>
+              <c:ptCount val="1"/>
+              <c:pt idx="0">
+                <c:v>Costo</c:v>
+              </c:pt>
+            </c:strLit>
+          </c:cat>
+          <c:val>
+            <c:numRef>
+              <c:f>'3_PDC'!$Q$31</c:f>
+              <c:numCache>
+                <c:formatCode>"€"\ #,##0.00</c:formatCode>
+                <c:ptCount val="1"/>
+                <c:pt idx="0">
+                  <c:v>6982</c:v>
+                </c:pt>
+              </c:numCache>
+            </c:numRef>
+          </c:val>
+        </c:ser>
+        <c:ser>
+          <c:idx val="1"/>
+          <c:order val="1"/>
+          <c:tx>
+            <c:v>Consuntivo</c:v>
+          </c:tx>
+          <c:invertIfNegative val="0"/>
+          <c:dLbls>
+            <c:numFmt formatCode="&quot;€&quot;\ #,##0.00" sourceLinked="0"/>
+            <c:txPr>
+              <a:bodyPr/>
+              <a:lstStyle/>
+              <a:p>
+                <a:pPr>
+                  <a:defRPr u="none"/>
+                </a:pPr>
+                <a:endParaRPr lang="it-IT"/>
+              </a:p>
+            </c:txPr>
+            <c:showLegendKey val="0"/>
+            <c:showVal val="1"/>
+            <c:showCatName val="0"/>
+            <c:showSerName val="0"/>
+            <c:showPercent val="0"/>
+            <c:showBubbleSize val="0"/>
+            <c:showLeaderLines val="0"/>
+          </c:dLbls>
+          <c:cat>
+            <c:strLit>
+              <c:ptCount val="1"/>
+              <c:pt idx="0">
+                <c:v>Costo</c:v>
+              </c:pt>
+            </c:strLit>
+          </c:cat>
+          <c:val>
+            <c:numRef>
+              <c:f>'3_PDC'!$Q$7</c:f>
+              <c:numCache>
+                <c:formatCode>"€"\ #,##0.00</c:formatCode>
+                <c:ptCount val="1"/>
+                <c:pt idx="0">
+                  <c:v>6992</c:v>
+                </c:pt>
+              </c:numCache>
+            </c:numRef>
+          </c:val>
+        </c:ser>
+        <c:dLbls>
+          <c:showLegendKey val="0"/>
+          <c:showVal val="0"/>
+          <c:showCatName val="0"/>
+          <c:showSerName val="0"/>
+          <c:showPercent val="0"/>
+          <c:showBubbleSize val="0"/>
+        </c:dLbls>
+        <c:gapWidth val="150"/>
+        <c:shape val="box"/>
+        <c:axId val="115445120"/>
+        <c:axId val="37381248"/>
+        <c:axId val="0"/>
+      </c:bar3DChart>
+      <c:catAx>
+        <c:axId val="115445120"/>
+        <c:scaling>
+          <c:orientation val="minMax"/>
+        </c:scaling>
+        <c:delete val="0"/>
+        <c:axPos val="l"/>
+        <c:majorTickMark val="out"/>
+        <c:minorTickMark val="none"/>
+        <c:tickLblPos val="nextTo"/>
+        <c:crossAx val="37381248"/>
+        <c:crosses val="autoZero"/>
+        <c:auto val="1"/>
+        <c:lblAlgn val="ctr"/>
+        <c:lblOffset val="100"/>
+        <c:noMultiLvlLbl val="0"/>
+      </c:catAx>
+      <c:valAx>
+        <c:axId val="37381248"/>
+        <c:scaling>
+          <c:orientation val="minMax"/>
+          <c:min val="0"/>
+        </c:scaling>
+        <c:delete val="0"/>
+        <c:axPos val="b"/>
+        <c:majorGridlines/>
+        <c:numFmt formatCode="&quot;€&quot;\ #,##0.00" sourceLinked="1"/>
+        <c:majorTickMark val="out"/>
+        <c:minorTickMark val="none"/>
+        <c:tickLblPos val="nextTo"/>
+        <c:crossAx val="115445120"/>
+        <c:crosses val="autoZero"/>
+        <c:crossBetween val="between"/>
+      </c:valAx>
+    </c:plotArea>
+    <c:legend>
+      <c:legendPos val="r"/>
+      <c:layout/>
+      <c:overlay val="0"/>
+    </c:legend>
+    <c:plotVisOnly val="1"/>
+    <c:dispBlanksAs val="gap"/>
+    <c:showDLblsOverMax val="0"/>
+  </c:chart>
+  <c:spPr>
+    <a:gradFill>
+      <a:gsLst>
+        <a:gs pos="0">
+          <a:schemeClr val="accent4"/>
+        </a:gs>
+        <a:gs pos="50000">
+          <a:schemeClr val="accent1">
+            <a:tint val="44500"/>
+            <a:satMod val="160000"/>
+          </a:schemeClr>
+        </a:gs>
+        <a:gs pos="100000">
+          <a:schemeClr val="accent1">
+            <a:tint val="23500"/>
+            <a:satMod val="160000"/>
+          </a:schemeClr>
+        </a:gs>
+      </a:gsLst>
+      <a:lin ang="5400000" scaled="0"/>
+    </a:gradFill>
+  </c:spPr>
+  <c:txPr>
+    <a:bodyPr/>
+    <a:lstStyle/>
+    <a:p>
+      <a:pPr>
+        <a:defRPr u="sng"/>
+      </a:pPr>
+      <a:endParaRPr lang="it-IT"/>
+    </a:p>
+  </c:txPr>
+  <c:externalData r:id="rId1">
+    <c:autoUpdate val="0"/>
+  </c:externalData>
+</c:chartSpace>
 </file>
 
 <file path=ppt/notesMasters/notesMaster1.xml><?xml version="1.0" encoding="utf-8"?>
@@ -14614,29 +14860,43 @@
           <a:bodyPr/>
           <a:lstStyle/>
           <a:p>
-            <a:endParaRPr lang="it-IT"/>
+            <a:r>
+              <a:rPr lang="it-IT" dirty="0" smtClean="0"/>
+              <a:t>Architettura Generale</a:t>
+            </a:r>
+            <a:endParaRPr lang="it-IT" dirty="0"/>
           </a:p>
         </p:txBody>
       </p:sp>
-      <p:sp>
-        <p:nvSpPr>
-          <p:cNvPr id="3" name="Segnaposto contenuto 2"/>
-          <p:cNvSpPr>
-            <a:spLocks noGrp="1"/>
-          </p:cNvSpPr>
+      <p:pic>
+        <p:nvPicPr>
+          <p:cNvPr id="7" name="Segnaposto contenuto 6"/>
+          <p:cNvPicPr>
+            <a:picLocks noGrp="1" noChangeAspect="1"/>
+          </p:cNvPicPr>
           <p:nvPr>
             <p:ph idx="1"/>
           </p:nvPr>
-        </p:nvSpPr>
-        <p:spPr/>
-        <p:txBody>
-          <a:bodyPr/>
-          <a:lstStyle/>
-          <a:p>
-            <a:endParaRPr lang="it-IT"/>
-          </a:p>
-        </p:txBody>
-      </p:sp>
+        </p:nvPicPr>
+        <p:blipFill>
+          <a:blip r:embed="rId3" cstate="print">
+            <a:extLst>
+              <a:ext uri="{28A0092B-C50C-407E-A947-70E740481C1C}">
+                <a14:useLocalDpi xmlns:a14="http://schemas.microsoft.com/office/drawing/2010/main" val="0"/>
+              </a:ext>
+            </a:extLst>
+          </a:blip>
+          <a:stretch>
+            <a:fillRect/>
+          </a:stretch>
+        </p:blipFill>
+        <p:spPr>
+          <a:xfrm>
+            <a:off x="1187624" y="2079166"/>
+            <a:ext cx="6760339" cy="4230154"/>
+          </a:xfrm>
+        </p:spPr>
+      </p:pic>
       <p:sp>
         <p:nvSpPr>
           <p:cNvPr id="4" name="Segnaposto data 3"/>
@@ -14694,6 +14954,494 @@
   <p:clrMapOvr>
     <a:masterClrMapping/>
   </p:clrMapOvr>
+  <p:timing>
+    <p:tnLst>
+      <p:par>
+        <p:cTn id="1" dur="indefinite" restart="never" nodeType="tmRoot"/>
+      </p:par>
+    </p:tnLst>
+  </p:timing>
+</p:sld>
+</file>
+
+<file path=ppt/slides/slide4.xml><?xml version="1.0" encoding="utf-8"?>
+<p:sld xmlns:a="http://schemas.openxmlformats.org/drawingml/2006/main" xmlns:r="http://schemas.openxmlformats.org/officeDocument/2006/relationships" xmlns:p="http://schemas.openxmlformats.org/presentationml/2006/main">
+  <p:cSld>
+    <p:spTree>
+      <p:nvGrpSpPr>
+        <p:cNvPr id="1" name=""/>
+        <p:cNvGrpSpPr/>
+        <p:nvPr/>
+      </p:nvGrpSpPr>
+      <p:grpSpPr>
+        <a:xfrm>
+          <a:off x="0" y="0"/>
+          <a:ext cx="0" cy="0"/>
+          <a:chOff x="0" y="0"/>
+          <a:chExt cx="0" cy="0"/>
+        </a:xfrm>
+      </p:grpSpPr>
+      <p:sp>
+        <p:nvSpPr>
+          <p:cNvPr id="2" name="Titolo 1"/>
+          <p:cNvSpPr>
+            <a:spLocks noGrp="1"/>
+          </p:cNvSpPr>
+          <p:nvPr>
+            <p:ph type="title"/>
+          </p:nvPr>
+        </p:nvSpPr>
+        <p:spPr/>
+        <p:txBody>
+          <a:bodyPr>
+            <a:normAutofit fontScale="90000"/>
+          </a:bodyPr>
+          <a:lstStyle/>
+          <a:p>
+            <a:r>
+              <a:rPr lang="it-IT" dirty="0" smtClean="0"/>
+              <a:t>Nuovi design pattern introdotti</a:t>
+            </a:r>
+            <a:endParaRPr lang="it-IT" dirty="0"/>
+          </a:p>
+        </p:txBody>
+      </p:sp>
+      <p:sp>
+        <p:nvSpPr>
+          <p:cNvPr id="3" name="Segnaposto contenuto 2"/>
+          <p:cNvSpPr>
+            <a:spLocks noGrp="1"/>
+          </p:cNvSpPr>
+          <p:nvPr>
+            <p:ph idx="1"/>
+          </p:nvPr>
+        </p:nvSpPr>
+        <p:spPr/>
+        <p:txBody>
+          <a:bodyPr>
+            <a:normAutofit lnSpcReduction="10000"/>
+          </a:bodyPr>
+          <a:lstStyle/>
+          <a:p>
+            <a:r>
+              <a:rPr lang="it-IT" dirty="0" smtClean="0"/>
+              <a:t>Design Pattern architetturali</a:t>
+            </a:r>
+          </a:p>
+          <a:p>
+            <a:pPr lvl="1"/>
+            <a:r>
+              <a:rPr lang="it-IT" dirty="0" err="1" smtClean="0"/>
+              <a:t>Multitier</a:t>
+            </a:r>
+            <a:r>
+              <a:rPr lang="it-IT" dirty="0" smtClean="0"/>
+              <a:t>: front-end e back-end</a:t>
+            </a:r>
+          </a:p>
+          <a:p>
+            <a:pPr lvl="1"/>
+            <a:r>
+              <a:rPr lang="it-IT" dirty="0" smtClean="0"/>
+              <a:t>Model </a:t>
+            </a:r>
+            <a:r>
+              <a:rPr lang="it-IT" dirty="0" err="1" smtClean="0"/>
+              <a:t>View</a:t>
+            </a:r>
+            <a:r>
+              <a:rPr lang="it-IT" dirty="0" smtClean="0"/>
+              <a:t> </a:t>
+            </a:r>
+            <a:r>
+              <a:rPr lang="it-IT" dirty="0" err="1" smtClean="0"/>
+              <a:t>Presenter</a:t>
+            </a:r>
+            <a:r>
+              <a:rPr lang="it-IT" dirty="0" smtClean="0"/>
+              <a:t> (MVP): architettura generale</a:t>
+            </a:r>
+          </a:p>
+          <a:p>
+            <a:r>
+              <a:rPr lang="it-IT" dirty="0" smtClean="0"/>
+              <a:t>Altri design pattern</a:t>
+            </a:r>
+          </a:p>
+          <a:p>
+            <a:pPr lvl="1"/>
+            <a:r>
+              <a:rPr lang="it-IT" dirty="0" smtClean="0"/>
+              <a:t>Singleton</a:t>
+            </a:r>
+          </a:p>
+          <a:p>
+            <a:pPr lvl="1"/>
+            <a:r>
+              <a:rPr lang="it-IT" dirty="0" err="1" smtClean="0"/>
+              <a:t>Façade</a:t>
+            </a:r>
+            <a:endParaRPr lang="it-IT" dirty="0" smtClean="0"/>
+          </a:p>
+          <a:p>
+            <a:pPr lvl="1"/>
+            <a:r>
+              <a:rPr lang="it-IT" dirty="0" smtClean="0"/>
+              <a:t>Data Access Object (DAO)</a:t>
+            </a:r>
+          </a:p>
+          <a:p>
+            <a:pPr lvl="1"/>
+            <a:r>
+              <a:rPr lang="it-IT" dirty="0" err="1" smtClean="0"/>
+              <a:t>Factory</a:t>
+            </a:r>
+            <a:r>
+              <a:rPr lang="it-IT" dirty="0" smtClean="0"/>
+              <a:t> Method</a:t>
+            </a:r>
+            <a:endParaRPr lang="it-IT" dirty="0"/>
+          </a:p>
+        </p:txBody>
+      </p:sp>
+      <p:sp>
+        <p:nvSpPr>
+          <p:cNvPr id="4" name="Segnaposto data 3"/>
+          <p:cNvSpPr>
+            <a:spLocks noGrp="1"/>
+          </p:cNvSpPr>
+          <p:nvPr>
+            <p:ph type="dt" sz="half" idx="10"/>
+          </p:nvPr>
+        </p:nvSpPr>
+        <p:spPr/>
+        <p:txBody>
+          <a:bodyPr/>
+          <a:lstStyle/>
+          <a:p>
+            <a:r>
+              <a:rPr lang="it-IT" smtClean="0"/>
+              <a:t>Progetto Gamification - Team Committed</a:t>
+            </a:r>
+            <a:endParaRPr lang="it-IT"/>
+          </a:p>
+        </p:txBody>
+      </p:sp>
+      <p:sp>
+        <p:nvSpPr>
+          <p:cNvPr id="5" name="Segnaposto numero diapositiva 4"/>
+          <p:cNvSpPr>
+            <a:spLocks noGrp="1"/>
+          </p:cNvSpPr>
+          <p:nvPr>
+            <p:ph type="sldNum" sz="quarter" idx="12"/>
+          </p:nvPr>
+        </p:nvSpPr>
+        <p:spPr/>
+        <p:txBody>
+          <a:bodyPr/>
+          <a:lstStyle/>
+          <a:p>
+            <a:fld id="{017EC607-BD11-4D4E-AC5F-155C854A0B9D}" type="slidenum">
+              <a:rPr lang="it-IT" smtClean="0"/>
+              <a:pPr/>
+              <a:t>4</a:t>
+            </a:fld>
+            <a:endParaRPr lang="it-IT"/>
+          </a:p>
+        </p:txBody>
+      </p:sp>
+    </p:spTree>
+    <p:extLst>
+      <p:ext uri="{BB962C8B-B14F-4D97-AF65-F5344CB8AC3E}">
+        <p14:creationId xmlns:p14="http://schemas.microsoft.com/office/powerpoint/2010/main" val="418054552"/>
+      </p:ext>
+    </p:extLst>
+  </p:cSld>
+  <p:clrMapOvr>
+    <a:masterClrMapping/>
+  </p:clrMapOvr>
+  <p:timing>
+    <p:tnLst>
+      <p:par>
+        <p:cTn id="1" dur="indefinite" restart="never" nodeType="tmRoot"/>
+      </p:par>
+    </p:tnLst>
+  </p:timing>
+</p:sld>
+</file>
+
+<file path=ppt/slides/slide5.xml><?xml version="1.0" encoding="utf-8"?>
+<p:sld xmlns:a="http://schemas.openxmlformats.org/drawingml/2006/main" xmlns:r="http://schemas.openxmlformats.org/officeDocument/2006/relationships" xmlns:p="http://schemas.openxmlformats.org/presentationml/2006/main">
+  <p:cSld>
+    <p:spTree>
+      <p:nvGrpSpPr>
+        <p:cNvPr id="1" name=""/>
+        <p:cNvGrpSpPr/>
+        <p:nvPr/>
+      </p:nvGrpSpPr>
+      <p:grpSpPr>
+        <a:xfrm>
+          <a:off x="0" y="0"/>
+          <a:ext cx="0" cy="0"/>
+          <a:chOff x="0" y="0"/>
+          <a:chExt cx="0" cy="0"/>
+        </a:xfrm>
+      </p:grpSpPr>
+      <p:pic>
+        <p:nvPicPr>
+          <p:cNvPr id="7" name="Immagine 6"/>
+          <p:cNvPicPr>
+            <a:picLocks noChangeAspect="1"/>
+          </p:cNvPicPr>
+          <p:nvPr/>
+        </p:nvPicPr>
+        <p:blipFill>
+          <a:blip r:embed="rId2" cstate="print">
+            <a:extLst>
+              <a:ext uri="{28A0092B-C50C-407E-A947-70E740481C1C}">
+                <a14:useLocalDpi xmlns:a14="http://schemas.microsoft.com/office/drawing/2010/main" val="0"/>
+              </a:ext>
+            </a:extLst>
+          </a:blip>
+          <a:stretch>
+            <a:fillRect/>
+          </a:stretch>
+        </p:blipFill>
+        <p:spPr>
+          <a:xfrm>
+            <a:off x="2750630" y="1268760"/>
+            <a:ext cx="3765586" cy="4581128"/>
+          </a:xfrm>
+          <a:prstGeom prst="rect">
+            <a:avLst/>
+          </a:prstGeom>
+        </p:spPr>
+      </p:pic>
+      <p:sp>
+        <p:nvSpPr>
+          <p:cNvPr id="4" name="Segnaposto data 3"/>
+          <p:cNvSpPr>
+            <a:spLocks noGrp="1"/>
+          </p:cNvSpPr>
+          <p:nvPr>
+            <p:ph type="dt" sz="half" idx="10"/>
+          </p:nvPr>
+        </p:nvSpPr>
+        <p:spPr/>
+        <p:txBody>
+          <a:bodyPr/>
+          <a:lstStyle/>
+          <a:p>
+            <a:r>
+              <a:rPr lang="it-IT" smtClean="0"/>
+              <a:t>Progetto Gamification - Team Committed</a:t>
+            </a:r>
+            <a:endParaRPr lang="it-IT"/>
+          </a:p>
+        </p:txBody>
+      </p:sp>
+      <p:sp>
+        <p:nvSpPr>
+          <p:cNvPr id="5" name="Segnaposto numero diapositiva 4"/>
+          <p:cNvSpPr>
+            <a:spLocks noGrp="1"/>
+          </p:cNvSpPr>
+          <p:nvPr>
+            <p:ph type="sldNum" sz="quarter" idx="12"/>
+          </p:nvPr>
+        </p:nvSpPr>
+        <p:spPr/>
+        <p:txBody>
+          <a:bodyPr/>
+          <a:lstStyle/>
+          <a:p>
+            <a:fld id="{017EC607-BD11-4D4E-AC5F-155C854A0B9D}" type="slidenum">
+              <a:rPr lang="it-IT" smtClean="0"/>
+              <a:pPr/>
+              <a:t>5</a:t>
+            </a:fld>
+            <a:endParaRPr lang="it-IT"/>
+          </a:p>
+        </p:txBody>
+      </p:sp>
+      <p:graphicFrame>
+        <p:nvGraphicFramePr>
+          <p:cNvPr id="6" name="Grafico 5"/>
+          <p:cNvGraphicFramePr>
+            <a:graphicFrameLocks/>
+          </p:cNvGraphicFramePr>
+          <p:nvPr>
+            <p:extLst>
+              <p:ext uri="{D42A27DB-BD31-4B8C-83A1-F6EECF244321}">
+                <p14:modId xmlns:p14="http://schemas.microsoft.com/office/powerpoint/2010/main" val="2096230454"/>
+              </p:ext>
+            </p:extLst>
+          </p:nvPr>
+        </p:nvGraphicFramePr>
+        <p:xfrm>
+          <a:off x="755576" y="1844824"/>
+          <a:ext cx="7704856" cy="3384376"/>
+        </p:xfrm>
+        <a:graphic>
+          <a:graphicData uri="http://schemas.openxmlformats.org/drawingml/2006/chart">
+            <c:chart xmlns:c="http://schemas.openxmlformats.org/drawingml/2006/chart" xmlns:r="http://schemas.openxmlformats.org/officeDocument/2006/relationships" r:id="rId3"/>
+          </a:graphicData>
+        </a:graphic>
+      </p:graphicFrame>
+    </p:spTree>
+    <p:extLst>
+      <p:ext uri="{BB962C8B-B14F-4D97-AF65-F5344CB8AC3E}">
+        <p14:creationId xmlns:p14="http://schemas.microsoft.com/office/powerpoint/2010/main" val="639624037"/>
+      </p:ext>
+    </p:extLst>
+  </p:cSld>
+  <p:clrMapOvr>
+    <a:masterClrMapping/>
+  </p:clrMapOvr>
+</p:sld>
+</file>
+
+<file path=ppt/slides/slide6.xml><?xml version="1.0" encoding="utf-8"?>
+<p:sld xmlns:a="http://schemas.openxmlformats.org/drawingml/2006/main" xmlns:r="http://schemas.openxmlformats.org/officeDocument/2006/relationships" xmlns:p="http://schemas.openxmlformats.org/presentationml/2006/main">
+  <p:cSld>
+    <p:spTree>
+      <p:nvGrpSpPr>
+        <p:cNvPr id="1" name=""/>
+        <p:cNvGrpSpPr/>
+        <p:nvPr/>
+      </p:nvGrpSpPr>
+      <p:grpSpPr>
+        <a:xfrm>
+          <a:off x="0" y="0"/>
+          <a:ext cx="0" cy="0"/>
+          <a:chOff x="0" y="0"/>
+          <a:chExt cx="0" cy="0"/>
+        </a:xfrm>
+      </p:grpSpPr>
+      <p:pic>
+        <p:nvPicPr>
+          <p:cNvPr id="9" name="Immagine 8"/>
+          <p:cNvPicPr>
+            <a:picLocks noChangeAspect="1"/>
+          </p:cNvPicPr>
+          <p:nvPr/>
+        </p:nvPicPr>
+        <p:blipFill>
+          <a:blip r:embed="rId2" cstate="print">
+            <a:extLst>
+              <a:ext uri="{28A0092B-C50C-407E-A947-70E740481C1C}">
+                <a14:useLocalDpi xmlns:a14="http://schemas.microsoft.com/office/drawing/2010/main" val="0"/>
+              </a:ext>
+            </a:extLst>
+          </a:blip>
+          <a:stretch>
+            <a:fillRect/>
+          </a:stretch>
+        </p:blipFill>
+        <p:spPr>
+          <a:xfrm>
+            <a:off x="2750630" y="1268760"/>
+            <a:ext cx="3765586" cy="4581128"/>
+          </a:xfrm>
+          <a:prstGeom prst="rect">
+            <a:avLst/>
+          </a:prstGeom>
+        </p:spPr>
+      </p:pic>
+      <p:sp>
+        <p:nvSpPr>
+          <p:cNvPr id="4" name="Segnaposto data 3"/>
+          <p:cNvSpPr>
+            <a:spLocks noGrp="1"/>
+          </p:cNvSpPr>
+          <p:nvPr>
+            <p:ph type="dt" sz="half" idx="10"/>
+          </p:nvPr>
+        </p:nvSpPr>
+        <p:spPr/>
+        <p:txBody>
+          <a:bodyPr/>
+          <a:lstStyle/>
+          <a:p>
+            <a:r>
+              <a:rPr lang="it-IT" smtClean="0"/>
+              <a:t>Progetto Gamification - Team Committed</a:t>
+            </a:r>
+            <a:endParaRPr lang="it-IT"/>
+          </a:p>
+        </p:txBody>
+      </p:sp>
+      <p:sp>
+        <p:nvSpPr>
+          <p:cNvPr id="5" name="Segnaposto numero diapositiva 4"/>
+          <p:cNvSpPr>
+            <a:spLocks noGrp="1"/>
+          </p:cNvSpPr>
+          <p:nvPr>
+            <p:ph type="sldNum" sz="quarter" idx="12"/>
+          </p:nvPr>
+        </p:nvSpPr>
+        <p:spPr/>
+        <p:txBody>
+          <a:bodyPr/>
+          <a:lstStyle/>
+          <a:p>
+            <a:fld id="{017EC607-BD11-4D4E-AC5F-155C854A0B9D}" type="slidenum">
+              <a:rPr lang="it-IT" smtClean="0"/>
+              <a:pPr/>
+              <a:t>6</a:t>
+            </a:fld>
+            <a:endParaRPr lang="it-IT"/>
+          </a:p>
+        </p:txBody>
+      </p:sp>
+      <p:pic>
+        <p:nvPicPr>
+          <p:cNvPr id="8" name="Segnaposto contenuto 7"/>
+          <p:cNvPicPr>
+            <a:picLocks noGrp="1" noChangeAspect="1"/>
+          </p:cNvPicPr>
+          <p:nvPr>
+            <p:ph idx="1"/>
+          </p:nvPr>
+        </p:nvPicPr>
+        <p:blipFill>
+          <a:blip r:embed="rId3">
+            <a:extLst>
+              <a:ext uri="{28A0092B-C50C-407E-A947-70E740481C1C}">
+                <a14:useLocalDpi xmlns:a14="http://schemas.microsoft.com/office/drawing/2010/main" val="0"/>
+              </a:ext>
+            </a:extLst>
+          </a:blip>
+          <a:stretch>
+            <a:fillRect/>
+          </a:stretch>
+        </p:blipFill>
+        <p:spPr>
+          <a:xfrm>
+            <a:off x="611560" y="2348880"/>
+            <a:ext cx="7906259" cy="2160240"/>
+          </a:xfrm>
+        </p:spPr>
+      </p:pic>
+    </p:spTree>
+    <p:extLst>
+      <p:ext uri="{BB962C8B-B14F-4D97-AF65-F5344CB8AC3E}">
+        <p14:creationId xmlns:p14="http://schemas.microsoft.com/office/powerpoint/2010/main" val="3920101374"/>
+      </p:ext>
+    </p:extLst>
+  </p:cSld>
+  <p:clrMapOvr>
+    <a:masterClrMapping/>
+  </p:clrMapOvr>
+  <p:timing>
+    <p:tnLst>
+      <p:par>
+        <p:cTn id="1" dur="indefinite" restart="never" nodeType="tmRoot"/>
+      </p:par>
+    </p:tnLst>
+  </p:timing>
 </p:sld>
 </file>
 

</xml_diff>

<commit_message>
[Presentazione] che sia finita 'sta noce? a domani per saperlo
</commit_message>
<xml_diff>
--- a/RQ/Esterni/Presentazione/RQ-Presentazione.pptx
+++ b/RQ/Esterni/Presentazione/RQ-Presentazione.pptx
@@ -5,24 +5,25 @@
     <p:sldMasterId id="2147483732" r:id="rId1"/>
   </p:sldMasterIdLst>
   <p:notesMasterIdLst>
-    <p:notesMasterId r:id="rId12"/>
+    <p:notesMasterId r:id="rId13"/>
   </p:notesMasterIdLst>
   <p:sldIdLst>
     <p:sldId id="256" r:id="rId2"/>
     <p:sldId id="289" r:id="rId3"/>
     <p:sldId id="290" r:id="rId4"/>
     <p:sldId id="291" r:id="rId5"/>
-    <p:sldId id="295" r:id="rId6"/>
+    <p:sldId id="301" r:id="rId6"/>
     <p:sldId id="296" r:id="rId7"/>
     <p:sldId id="297" r:id="rId8"/>
-    <p:sldId id="294" r:id="rId9"/>
-    <p:sldId id="293" r:id="rId10"/>
-    <p:sldId id="292" r:id="rId11"/>
+    <p:sldId id="300" r:id="rId9"/>
+    <p:sldId id="294" r:id="rId10"/>
+    <p:sldId id="293" r:id="rId11"/>
+    <p:sldId id="292" r:id="rId12"/>
   </p:sldIdLst>
   <p:sldSz cx="9144000" cy="6858000" type="screen4x3"/>
   <p:notesSz cx="6858000" cy="9144000"/>
   <p:custDataLst>
-    <p:tags r:id="rId13"/>
+    <p:tags r:id="rId14"/>
   </p:custDataLst>
   <p:defaultTextStyle>
     <a:defPPr>
@@ -132,13 +133,14 @@
           <p14:sldIdLst>
             <p14:sldId id="290"/>
             <p14:sldId id="291"/>
+            <p14:sldId id="301"/>
           </p14:sldIdLst>
         </p14:section>
         <p14:section name="Fase test" id="{8357C3EB-2135-4199-93ED-79403AB00DF0}">
           <p14:sldIdLst>
-            <p14:sldId id="295"/>
             <p14:sldId id="296"/>
             <p14:sldId id="297"/>
+            <p14:sldId id="300"/>
           </p14:sldIdLst>
         </p14:section>
         <p14:section name="Consuntivo" id="{A815DC9A-4E1A-4215-B2F9-580B6BAA931F}">
@@ -14901,6 +14903,157 @@
       </p:grpSpPr>
       <p:pic>
         <p:nvPicPr>
+          <p:cNvPr id="7" name="Immagine 6"/>
+          <p:cNvPicPr>
+            <a:picLocks noChangeAspect="1"/>
+          </p:cNvPicPr>
+          <p:nvPr/>
+        </p:nvPicPr>
+        <p:blipFill>
+          <a:blip r:embed="rId2" cstate="print">
+            <a:extLst>
+              <a:ext uri="{28A0092B-C50C-407E-A947-70E740481C1C}">
+                <a14:useLocalDpi xmlns:a14="http://schemas.microsoft.com/office/drawing/2010/main" val="0"/>
+              </a:ext>
+            </a:extLst>
+          </a:blip>
+          <a:stretch>
+            <a:fillRect/>
+          </a:stretch>
+        </p:blipFill>
+        <p:spPr>
+          <a:xfrm>
+            <a:off x="2750630" y="1268760"/>
+            <a:ext cx="3765586" cy="4581128"/>
+          </a:xfrm>
+          <a:prstGeom prst="rect">
+            <a:avLst/>
+          </a:prstGeom>
+        </p:spPr>
+      </p:pic>
+      <p:sp>
+        <p:nvSpPr>
+          <p:cNvPr id="4" name="Segnaposto data 3"/>
+          <p:cNvSpPr>
+            <a:spLocks noGrp="1"/>
+          </p:cNvSpPr>
+          <p:nvPr>
+            <p:ph type="dt" sz="half" idx="10"/>
+          </p:nvPr>
+        </p:nvSpPr>
+        <p:spPr/>
+        <p:txBody>
+          <a:bodyPr/>
+          <a:lstStyle/>
+          <a:p>
+            <a:r>
+              <a:rPr lang="it-IT" smtClean="0"/>
+              <a:t>Progetto Gamification - Team Committed</a:t>
+            </a:r>
+            <a:endParaRPr lang="it-IT"/>
+          </a:p>
+        </p:txBody>
+      </p:sp>
+      <p:graphicFrame>
+        <p:nvGraphicFramePr>
+          <p:cNvPr id="6" name="Grafico 5"/>
+          <p:cNvGraphicFramePr>
+            <a:graphicFrameLocks/>
+          </p:cNvGraphicFramePr>
+          <p:nvPr>
+            <p:extLst>
+              <p:ext uri="{D42A27DB-BD31-4B8C-83A1-F6EECF244321}">
+                <p14:modId xmlns:p14="http://schemas.microsoft.com/office/powerpoint/2010/main" val="2096230454"/>
+              </p:ext>
+            </p:extLst>
+          </p:nvPr>
+        </p:nvGraphicFramePr>
+        <p:xfrm>
+          <a:off x="755576" y="1844824"/>
+          <a:ext cx="7704856" cy="3384376"/>
+        </p:xfrm>
+        <a:graphic>
+          <a:graphicData uri="http://schemas.openxmlformats.org/drawingml/2006/chart">
+            <c:chart xmlns:c="http://schemas.openxmlformats.org/drawingml/2006/chart" xmlns:r="http://schemas.openxmlformats.org/officeDocument/2006/relationships" r:id="rId3"/>
+          </a:graphicData>
+        </a:graphic>
+      </p:graphicFrame>
+      <p:sp>
+        <p:nvSpPr>
+          <p:cNvPr id="8" name="Segnaposto numero diapositiva 4"/>
+          <p:cNvSpPr>
+            <a:spLocks noGrp="1"/>
+          </p:cNvSpPr>
+          <p:nvPr>
+            <p:ph type="sldNum" sz="quarter" idx="12"/>
+          </p:nvPr>
+        </p:nvSpPr>
+        <p:spPr>
+          <a:xfrm>
+            <a:off x="4649096" y="224491"/>
+            <a:ext cx="1332156" cy="365125"/>
+          </a:xfrm>
+        </p:spPr>
+        <p:txBody>
+          <a:bodyPr/>
+          <a:lstStyle/>
+          <a:p>
+            <a:fld id="{017EC607-BD11-4D4E-AC5F-155C854A0B9D}" type="slidenum">
+              <a:rPr lang="it-IT" smtClean="0"/>
+              <a:pPr/>
+              <a:t>10</a:t>
+            </a:fld>
+            <a:r>
+              <a:rPr lang="it-IT" dirty="0" smtClean="0"/>
+              <a:t> di </a:t>
+            </a:r>
+            <a:r>
+              <a:rPr lang="it-IT" dirty="0" smtClean="0"/>
+              <a:t>11</a:t>
+            </a:r>
+            <a:endParaRPr lang="it-IT" dirty="0" smtClean="0"/>
+          </a:p>
+        </p:txBody>
+      </p:sp>
+    </p:spTree>
+    <p:extLst>
+      <p:ext uri="{BB962C8B-B14F-4D97-AF65-F5344CB8AC3E}">
+        <p14:creationId xmlns:p14="http://schemas.microsoft.com/office/powerpoint/2010/main" val="639624037"/>
+      </p:ext>
+    </p:extLst>
+  </p:cSld>
+  <p:clrMapOvr>
+    <a:masterClrMapping/>
+  </p:clrMapOvr>
+  <p:timing>
+    <p:tnLst>
+      <p:par>
+        <p:cTn id="1" dur="indefinite" restart="never" nodeType="tmRoot"/>
+      </p:par>
+    </p:tnLst>
+  </p:timing>
+</p:sld>
+</file>
+
+<file path=ppt/slides/slide11.xml><?xml version="1.0" encoding="utf-8"?>
+<p:sld xmlns:a="http://schemas.openxmlformats.org/drawingml/2006/main" xmlns:r="http://schemas.openxmlformats.org/officeDocument/2006/relationships" xmlns:p="http://schemas.openxmlformats.org/presentationml/2006/main">
+  <p:cSld>
+    <p:spTree>
+      <p:nvGrpSpPr>
+        <p:cNvPr id="1" name=""/>
+        <p:cNvGrpSpPr/>
+        <p:nvPr/>
+      </p:nvGrpSpPr>
+      <p:grpSpPr>
+        <a:xfrm>
+          <a:off x="0" y="0"/>
+          <a:ext cx="0" cy="0"/>
+          <a:chOff x="0" y="0"/>
+          <a:chExt cx="0" cy="0"/>
+        </a:xfrm>
+      </p:grpSpPr>
+      <p:pic>
+        <p:nvPicPr>
           <p:cNvPr id="9" name="Immagine 8"/>
           <p:cNvPicPr>
             <a:picLocks noChangeAspect="1"/>
@@ -15004,12 +15157,17 @@
             <a:fld id="{017EC607-BD11-4D4E-AC5F-155C854A0B9D}" type="slidenum">
               <a:rPr lang="it-IT" smtClean="0"/>
               <a:pPr/>
-              <a:t>10</a:t>
+              <a:t>11</a:t>
             </a:fld>
             <a:r>
               <a:rPr lang="it-IT" dirty="0" smtClean="0"/>
-              <a:t> di 8</a:t>
+              <a:t> di </a:t>
             </a:r>
+            <a:r>
+              <a:rPr lang="it-IT" dirty="0" smtClean="0"/>
+              <a:t>11</a:t>
+            </a:r>
+            <a:endParaRPr lang="it-IT" dirty="0" smtClean="0"/>
           </a:p>
         </p:txBody>
       </p:sp>
@@ -15203,8 +15361,13 @@
             </a:fld>
             <a:r>
               <a:rPr lang="it-IT" dirty="0" smtClean="0"/>
-              <a:t> di 8</a:t>
+              <a:t> di </a:t>
             </a:r>
+            <a:r>
+              <a:rPr lang="it-IT" dirty="0" smtClean="0"/>
+              <a:t>11</a:t>
+            </a:r>
+            <a:endParaRPr lang="it-IT" dirty="0" smtClean="0"/>
           </a:p>
         </p:txBody>
       </p:sp>
@@ -15377,8 +15540,13 @@
             </a:fld>
             <a:r>
               <a:rPr lang="it-IT" dirty="0" smtClean="0"/>
-              <a:t> di 8</a:t>
+              <a:t> di </a:t>
             </a:r>
+            <a:r>
+              <a:rPr lang="it-IT" dirty="0" smtClean="0"/>
+              <a:t>11</a:t>
+            </a:r>
+            <a:endParaRPr lang="it-IT" dirty="0" smtClean="0"/>
           </a:p>
         </p:txBody>
       </p:sp>
@@ -15493,7 +15661,15 @@
           <a:p>
             <a:r>
               <a:rPr lang="it-IT" dirty="0" smtClean="0"/>
-              <a:t>Design Pattern architetturali</a:t>
+              <a:t>Design </a:t>
+            </a:r>
+            <a:r>
+              <a:rPr lang="it-IT" dirty="0" smtClean="0"/>
+              <a:t>Pattern e stili </a:t>
+            </a:r>
+            <a:r>
+              <a:rPr lang="it-IT" dirty="0" smtClean="0"/>
+              <a:t>architetturali</a:t>
             </a:r>
           </a:p>
           <a:p>
@@ -15622,8 +15798,13 @@
             </a:fld>
             <a:r>
               <a:rPr lang="it-IT" dirty="0" smtClean="0"/>
-              <a:t> di 8</a:t>
+              <a:t> di </a:t>
             </a:r>
+            <a:r>
+              <a:rPr lang="it-IT" dirty="0" smtClean="0"/>
+              <a:t>11</a:t>
+            </a:r>
+            <a:endParaRPr lang="it-IT" dirty="0" smtClean="0"/>
           </a:p>
         </p:txBody>
       </p:sp>
@@ -15664,36 +15845,6 @@
           <a:chExt cx="0" cy="0"/>
         </a:xfrm>
       </p:grpSpPr>
-      <p:pic>
-        <p:nvPicPr>
-          <p:cNvPr id="7" name="Immagine 6"/>
-          <p:cNvPicPr>
-            <a:picLocks noChangeAspect="1"/>
-          </p:cNvPicPr>
-          <p:nvPr/>
-        </p:nvPicPr>
-        <p:blipFill>
-          <a:blip r:embed="rId2" cstate="print">
-            <a:extLst>
-              <a:ext uri="{28A0092B-C50C-407E-A947-70E740481C1C}">
-                <a14:useLocalDpi xmlns:a14="http://schemas.microsoft.com/office/drawing/2010/main" val="0"/>
-              </a:ext>
-            </a:extLst>
-          </a:blip>
-          <a:stretch>
-            <a:fillRect/>
-          </a:stretch>
-        </p:blipFill>
-        <p:spPr>
-          <a:xfrm>
-            <a:off x="2750630" y="1268760"/>
-            <a:ext cx="3765586" cy="4581128"/>
-          </a:xfrm>
-          <a:prstGeom prst="rect">
-            <a:avLst/>
-          </a:prstGeom>
-        </p:spPr>
-      </p:pic>
       <p:sp>
         <p:nvSpPr>
           <p:cNvPr id="2" name="Titolo 1"/>
@@ -15707,13 +15858,13 @@
         <p:spPr/>
         <p:txBody>
           <a:bodyPr>
-            <a:normAutofit fontScale="90000"/>
+            <a:normAutofit/>
           </a:bodyPr>
           <a:lstStyle/>
           <a:p>
             <a:r>
               <a:rPr lang="it-IT" dirty="0" smtClean="0"/>
-              <a:t>Verifiche – Strumenti utilizzati</a:t>
+              <a:t>Fase di Verifica</a:t>
             </a:r>
             <a:endParaRPr lang="it-IT" dirty="0"/>
           </a:p>
@@ -15735,31 +15886,52 @@
           <a:lstStyle/>
           <a:p>
             <a:r>
+              <a:rPr lang="it-IT" dirty="0" smtClean="0"/>
+              <a:t>Analisi statica</a:t>
+            </a:r>
+          </a:p>
+          <a:p>
+            <a:pPr lvl="1"/>
+            <a:r>
               <a:rPr lang="it-IT" dirty="0" err="1" smtClean="0"/>
-              <a:t>FindBugs</a:t>
+              <a:t>Walkthrough</a:t>
             </a:r>
             <a:endParaRPr lang="it-IT" dirty="0" smtClean="0"/>
           </a:p>
           <a:p>
-            <a:r>
-              <a:rPr lang="it-IT" dirty="0" err="1"/>
-              <a:t>Metrics</a:t>
-            </a:r>
-            <a:endParaRPr lang="it-IT" dirty="0"/>
-          </a:p>
-          <a:p>
+            <a:pPr lvl="1"/>
             <a:r>
               <a:rPr lang="it-IT" dirty="0" err="1" smtClean="0"/>
-              <a:t>EclEmma</a:t>
+              <a:t>Inspection</a:t>
             </a:r>
             <a:endParaRPr lang="it-IT" dirty="0" smtClean="0"/>
           </a:p>
           <a:p>
+            <a:pPr lvl="1"/>
             <a:r>
-              <a:rPr lang="it-IT" dirty="0" err="1" smtClean="0"/>
-              <a:t>JUnit</a:t>
+              <a:rPr lang="it-IT" dirty="0" smtClean="0"/>
+              <a:t>Metriche</a:t>
             </a:r>
-            <a:endParaRPr lang="it-IT" dirty="0"/>
+          </a:p>
+          <a:p>
+            <a:r>
+              <a:rPr lang="it-IT" dirty="0" smtClean="0"/>
+              <a:t>Analisi dinamica</a:t>
+            </a:r>
+          </a:p>
+          <a:p>
+            <a:pPr lvl="1"/>
+            <a:r>
+              <a:rPr lang="it-IT" dirty="0" smtClean="0"/>
+              <a:t>Test di unità</a:t>
+            </a:r>
+          </a:p>
+          <a:p>
+            <a:pPr lvl="1"/>
+            <a:r>
+              <a:rPr lang="it-IT" dirty="0" smtClean="0"/>
+              <a:t>Test di integrazione</a:t>
+            </a:r>
           </a:p>
         </p:txBody>
       </p:sp>
@@ -15813,15 +15985,20 @@
             </a:fld>
             <a:r>
               <a:rPr lang="it-IT" dirty="0" smtClean="0"/>
-              <a:t> di 8</a:t>
+              <a:t> di </a:t>
             </a:r>
+            <a:r>
+              <a:rPr lang="it-IT" dirty="0" smtClean="0"/>
+              <a:t>11</a:t>
+            </a:r>
+            <a:endParaRPr lang="it-IT" dirty="0" smtClean="0"/>
           </a:p>
         </p:txBody>
       </p:sp>
     </p:spTree>
     <p:extLst>
       <p:ext uri="{BB962C8B-B14F-4D97-AF65-F5344CB8AC3E}">
-        <p14:creationId xmlns:p14="http://schemas.microsoft.com/office/powerpoint/2010/main" val="3077270303"/>
+        <p14:creationId xmlns:p14="http://schemas.microsoft.com/office/powerpoint/2010/main" val="2957052404"/>
       </p:ext>
     </p:extLst>
   </p:cSld>
@@ -15950,62 +16127,9 @@
             </a:r>
             <a:r>
               <a:rPr lang="it-IT" dirty="0" err="1" smtClean="0"/>
-              <a:t>FindBug</a:t>
+              <a:t>FindBugs</a:t>
             </a:r>
             <a:endParaRPr lang="it-IT" dirty="0" smtClean="0"/>
-          </a:p>
-          <a:p>
-            <a:pPr marL="525780" indent="-457200">
-              <a:buFont typeface="+mj-lt"/>
-              <a:buAutoNum type="arabicPeriod"/>
-            </a:pPr>
-            <a:r>
-              <a:rPr lang="it-IT" dirty="0" smtClean="0"/>
-              <a:t>Test dinamico</a:t>
-            </a:r>
-          </a:p>
-          <a:p>
-            <a:pPr marL="822960" lvl="1" indent="-457200">
-              <a:buFont typeface="+mj-lt"/>
-              <a:buAutoNum type="arabicPeriod"/>
-            </a:pPr>
-            <a:r>
-              <a:rPr lang="it-IT" dirty="0" smtClean="0"/>
-              <a:t>Creazione della classe di test per </a:t>
-            </a:r>
-            <a:r>
-              <a:rPr lang="it-IT" dirty="0" err="1" smtClean="0"/>
-              <a:t>JUnit</a:t>
-            </a:r>
-            <a:endParaRPr lang="it-IT" dirty="0"/>
-          </a:p>
-          <a:p>
-            <a:pPr marL="1097280" lvl="2" indent="-457200">
-              <a:buFont typeface="+mj-lt"/>
-              <a:buAutoNum type="arabicPeriod"/>
-            </a:pPr>
-            <a:r>
-              <a:rPr lang="it-IT" dirty="0" smtClean="0"/>
-              <a:t>Creazione metodo </a:t>
-            </a:r>
-            <a:r>
-              <a:rPr lang="it-IT" dirty="0" err="1" smtClean="0"/>
-              <a:t>init</a:t>
-            </a:r>
-            <a:r>
-              <a:rPr lang="it-IT" dirty="0" smtClean="0"/>
-              <a:t>()</a:t>
-            </a:r>
-          </a:p>
-          <a:p>
-            <a:pPr marL="1097280" lvl="2" indent="-457200">
-              <a:buFont typeface="+mj-lt"/>
-              <a:buAutoNum type="arabicPeriod"/>
-            </a:pPr>
-            <a:r>
-              <a:rPr lang="it-IT" dirty="0" smtClean="0"/>
-              <a:t>Creazione metodi di test</a:t>
-            </a:r>
           </a:p>
         </p:txBody>
       </p:sp>
@@ -16034,7 +16158,7 @@
       </p:sp>
       <p:sp>
         <p:nvSpPr>
-          <p:cNvPr id="5" name="Segnaposto numero diapositiva 4"/>
+          <p:cNvPr id="7" name="Segnaposto numero diapositiva 4"/>
           <p:cNvSpPr>
             <a:spLocks noGrp="1"/>
           </p:cNvSpPr>
@@ -16042,7 +16166,12 @@
             <p:ph type="sldNum" sz="quarter" idx="12"/>
           </p:nvPr>
         </p:nvSpPr>
-        <p:spPr/>
+        <p:spPr>
+          <a:xfrm>
+            <a:off x="4649096" y="224491"/>
+            <a:ext cx="1332156" cy="365125"/>
+          </a:xfrm>
+        </p:spPr>
         <p:txBody>
           <a:bodyPr/>
           <a:lstStyle/>
@@ -16052,10 +16181,48 @@
               <a:pPr/>
               <a:t>6</a:t>
             </a:fld>
-            <a:endParaRPr lang="it-IT"/>
+            <a:r>
+              <a:rPr lang="it-IT" dirty="0" smtClean="0"/>
+              <a:t> di </a:t>
+            </a:r>
+            <a:r>
+              <a:rPr lang="it-IT" dirty="0" smtClean="0"/>
+              <a:t>11</a:t>
+            </a:r>
+            <a:endParaRPr lang="it-IT" dirty="0" smtClean="0"/>
           </a:p>
         </p:txBody>
       </p:sp>
+      <p:pic>
+        <p:nvPicPr>
+          <p:cNvPr id="9" name="Segnaposto contenuto 5"/>
+          <p:cNvPicPr>
+            <a:picLocks noChangeAspect="1"/>
+          </p:cNvPicPr>
+          <p:nvPr/>
+        </p:nvPicPr>
+        <p:blipFill>
+          <a:blip r:embed="rId3">
+            <a:extLst>
+              <a:ext uri="{28A0092B-C50C-407E-A947-70E740481C1C}">
+                <a14:useLocalDpi xmlns:a14="http://schemas.microsoft.com/office/drawing/2010/main" val="0"/>
+              </a:ext>
+            </a:extLst>
+          </a:blip>
+          <a:stretch>
+            <a:fillRect/>
+          </a:stretch>
+        </p:blipFill>
+        <p:spPr>
+          <a:xfrm>
+            <a:off x="971600" y="3789040"/>
+            <a:ext cx="6972314" cy="2327835"/>
+          </a:xfrm>
+          <a:prstGeom prst="rect">
+            <a:avLst/>
+          </a:prstGeom>
+        </p:spPr>
+      </p:pic>
     </p:spTree>
     <p:extLst>
       <p:ext uri="{BB962C8B-B14F-4D97-AF65-F5344CB8AC3E}">
@@ -16066,6 +16233,13 @@
   <p:clrMapOvr>
     <a:masterClrMapping/>
   </p:clrMapOvr>
+  <p:timing>
+    <p:tnLst>
+      <p:par>
+        <p:cTn id="1" dur="indefinite" restart="never" nodeType="tmRoot"/>
+      </p:par>
+    </p:tnLst>
+  </p:timing>
 </p:sld>
 </file>
 
@@ -16116,35 +16290,6 @@
           </a:prstGeom>
         </p:spPr>
       </p:pic>
-      <p:pic>
-        <p:nvPicPr>
-          <p:cNvPr id="6" name="Segnaposto contenuto 5"/>
-          <p:cNvPicPr>
-            <a:picLocks noGrp="1" noChangeAspect="1"/>
-          </p:cNvPicPr>
-          <p:nvPr>
-            <p:ph idx="1"/>
-          </p:nvPr>
-        </p:nvPicPr>
-        <p:blipFill>
-          <a:blip r:embed="rId3">
-            <a:extLst>
-              <a:ext uri="{28A0092B-C50C-407E-A947-70E740481C1C}">
-                <a14:useLocalDpi xmlns:a14="http://schemas.microsoft.com/office/drawing/2010/main" val="0"/>
-              </a:ext>
-            </a:extLst>
-          </a:blip>
-          <a:stretch>
-            <a:fillRect/>
-          </a:stretch>
-        </p:blipFill>
-        <p:spPr>
-          <a:xfrm>
-            <a:off x="683568" y="2204864"/>
-            <a:ext cx="7764402" cy="2592288"/>
-          </a:xfrm>
-        </p:spPr>
-      </p:pic>
       <p:sp>
         <p:nvSpPr>
           <p:cNvPr id="4" name="Segnaposto data 3"/>
@@ -16188,7 +16333,131 @@
               <a:pPr/>
               <a:t>7</a:t>
             </a:fld>
-            <a:endParaRPr lang="it-IT"/>
+            <a:r>
+              <a:rPr lang="it-IT" dirty="0" smtClean="0"/>
+              <a:t> di 11</a:t>
+            </a:r>
+            <a:endParaRPr lang="it-IT" dirty="0"/>
+          </a:p>
+        </p:txBody>
+      </p:sp>
+      <p:sp>
+        <p:nvSpPr>
+          <p:cNvPr id="10" name="Segnaposto contenuto 9"/>
+          <p:cNvSpPr>
+            <a:spLocks noGrp="1"/>
+          </p:cNvSpPr>
+          <p:nvPr>
+            <p:ph idx="1"/>
+          </p:nvPr>
+        </p:nvSpPr>
+        <p:spPr/>
+        <p:txBody>
+          <a:bodyPr>
+            <a:normAutofit/>
+          </a:bodyPr>
+          <a:lstStyle/>
+          <a:p>
+            <a:pPr marL="525780" indent="-457200">
+              <a:buFont typeface="+mj-lt"/>
+              <a:buAutoNum type="arabicPeriod"/>
+            </a:pPr>
+            <a:r>
+              <a:rPr lang="it-IT" dirty="0"/>
+              <a:t>Test </a:t>
+            </a:r>
+            <a:r>
+              <a:rPr lang="it-IT" dirty="0" smtClean="0"/>
+              <a:t>dinamici</a:t>
+            </a:r>
+          </a:p>
+          <a:p>
+            <a:pPr marL="822960" lvl="1" indent="-457200">
+              <a:buFont typeface="+mj-lt"/>
+              <a:buAutoNum type="arabicPeriod"/>
+            </a:pPr>
+            <a:r>
+              <a:rPr lang="it-IT" dirty="0"/>
+              <a:t>Creazione della classe di test per </a:t>
+            </a:r>
+            <a:r>
+              <a:rPr lang="it-IT" dirty="0" err="1" smtClean="0"/>
+              <a:t>Junit</a:t>
+            </a:r>
+            <a:endParaRPr lang="it-IT" dirty="0" smtClean="0"/>
+          </a:p>
+          <a:p>
+            <a:pPr marL="822960" lvl="1" indent="-457200">
+              <a:buFont typeface="+mj-lt"/>
+              <a:buAutoNum type="arabicPeriod"/>
+            </a:pPr>
+            <a:r>
+              <a:rPr lang="it-IT" dirty="0" smtClean="0"/>
+              <a:t>Creazione </a:t>
+            </a:r>
+            <a:r>
+              <a:rPr lang="it-IT" dirty="0"/>
+              <a:t>metodo </a:t>
+            </a:r>
+            <a:r>
+              <a:rPr lang="it-IT" dirty="0" err="1"/>
+              <a:t>init</a:t>
+            </a:r>
+            <a:r>
+              <a:rPr lang="it-IT" dirty="0" smtClean="0"/>
+              <a:t>()</a:t>
+            </a:r>
+          </a:p>
+          <a:p>
+            <a:pPr marL="822960" lvl="1" indent="-457200">
+              <a:buFont typeface="+mj-lt"/>
+              <a:buAutoNum type="arabicPeriod"/>
+            </a:pPr>
+            <a:r>
+              <a:rPr lang="it-IT" dirty="0" smtClean="0"/>
+              <a:t>Creazione </a:t>
+            </a:r>
+            <a:r>
+              <a:rPr lang="it-IT" dirty="0"/>
+              <a:t>metodi di </a:t>
+            </a:r>
+            <a:r>
+              <a:rPr lang="it-IT" dirty="0" smtClean="0"/>
+              <a:t>test</a:t>
+            </a:r>
+          </a:p>
+          <a:p>
+            <a:pPr marL="365760" lvl="1" indent="0">
+              <a:buNone/>
+            </a:pPr>
+            <a:endParaRPr lang="it-IT" dirty="0" smtClean="0"/>
+          </a:p>
+          <a:p>
+            <a:pPr marL="525780" indent="-457200">
+              <a:buFont typeface="+mj-lt"/>
+              <a:buAutoNum type="arabicPeriod"/>
+            </a:pPr>
+            <a:r>
+              <a:rPr lang="it-IT" dirty="0" smtClean="0"/>
+              <a:t>Verifica Manuale</a:t>
+            </a:r>
+          </a:p>
+          <a:p>
+            <a:pPr marL="822960" lvl="1" indent="-457200">
+              <a:buFont typeface="+mj-lt"/>
+              <a:buAutoNum type="arabicPeriod"/>
+            </a:pPr>
+            <a:endParaRPr lang="it-IT" dirty="0"/>
+          </a:p>
+          <a:p>
+            <a:pPr marL="525780" indent="-457200">
+              <a:buFont typeface="+mj-lt"/>
+              <a:buAutoNum type="arabicPeriod"/>
+            </a:pPr>
+            <a:endParaRPr lang="it-IT" dirty="0" smtClean="0"/>
+          </a:p>
+          <a:p>
+            <a:endParaRPr lang="it-IT" dirty="0"/>
           </a:p>
         </p:txBody>
       </p:sp>
@@ -16202,10 +16471,206 @@
   <p:clrMapOvr>
     <a:masterClrMapping/>
   </p:clrMapOvr>
+  <p:timing>
+    <p:tnLst>
+      <p:par>
+        <p:cTn id="1" dur="indefinite" restart="never" nodeType="tmRoot"/>
+      </p:par>
+    </p:tnLst>
+  </p:timing>
 </p:sld>
 </file>
 
 <file path=ppt/slides/slide8.xml><?xml version="1.0" encoding="utf-8"?>
+<p:sld xmlns:a="http://schemas.openxmlformats.org/drawingml/2006/main" xmlns:r="http://schemas.openxmlformats.org/officeDocument/2006/relationships" xmlns:p="http://schemas.openxmlformats.org/presentationml/2006/main">
+  <p:cSld>
+    <p:spTree>
+      <p:nvGrpSpPr>
+        <p:cNvPr id="1" name=""/>
+        <p:cNvGrpSpPr/>
+        <p:nvPr/>
+      </p:nvGrpSpPr>
+      <p:grpSpPr>
+        <a:xfrm>
+          <a:off x="0" y="0"/>
+          <a:ext cx="0" cy="0"/>
+          <a:chOff x="0" y="0"/>
+          <a:chExt cx="0" cy="0"/>
+        </a:xfrm>
+      </p:grpSpPr>
+      <p:pic>
+        <p:nvPicPr>
+          <p:cNvPr id="6" name="Picture 2"/>
+          <p:cNvPicPr>
+            <a:picLocks noChangeAspect="1" noChangeArrowheads="1"/>
+          </p:cNvPicPr>
+          <p:nvPr/>
+        </p:nvPicPr>
+        <p:blipFill>
+          <a:blip r:embed="rId2">
+            <a:extLst>
+              <a:ext uri="{28A0092B-C50C-407E-A947-70E740481C1C}">
+                <a14:useLocalDpi xmlns:a14="http://schemas.microsoft.com/office/drawing/2010/main" val="0"/>
+              </a:ext>
+            </a:extLst>
+          </a:blip>
+          <a:srcRect/>
+          <a:stretch>
+            <a:fillRect/>
+          </a:stretch>
+        </p:blipFill>
+        <p:spPr bwMode="auto">
+          <a:xfrm>
+            <a:off x="2687638" y="1231900"/>
+            <a:ext cx="3767137" cy="4584700"/>
+          </a:xfrm>
+          <a:prstGeom prst="rect">
+            <a:avLst/>
+          </a:prstGeom>
+          <a:noFill/>
+          <a:ln>
+            <a:noFill/>
+          </a:ln>
+          <a:effectLst/>
+          <a:extLst>
+            <a:ext uri="{909E8E84-426E-40DD-AFC4-6F175D3DCCD1}">
+              <a14:hiddenFill xmlns:a14="http://schemas.microsoft.com/office/drawing/2010/main">
+                <a:solidFill>
+                  <a:schemeClr val="accent1"/>
+                </a:solidFill>
+              </a14:hiddenFill>
+            </a:ext>
+            <a:ext uri="{91240B29-F687-4F45-9708-019B960494DF}">
+              <a14:hiddenLine xmlns:a14="http://schemas.microsoft.com/office/drawing/2010/main" w="9525">
+                <a:solidFill>
+                  <a:schemeClr val="tx1"/>
+                </a:solidFill>
+                <a:miter lim="800000"/>
+                <a:headEnd/>
+                <a:tailEnd/>
+              </a14:hiddenLine>
+            </a:ext>
+            <a:ext uri="{AF507438-7753-43E0-B8FC-AC1667EBCBE1}">
+              <a14:hiddenEffects xmlns:a14="http://schemas.microsoft.com/office/drawing/2010/main">
+                <a:effectLst>
+                  <a:outerShdw dist="35921" dir="2700000" algn="ctr" rotWithShape="0">
+                    <a:schemeClr val="bg2"/>
+                  </a:outerShdw>
+                </a:effectLst>
+              </a14:hiddenEffects>
+            </a:ext>
+          </a:extLst>
+        </p:spPr>
+      </p:pic>
+      <p:sp>
+        <p:nvSpPr>
+          <p:cNvPr id="3" name="Segnaposto contenuto 2"/>
+          <p:cNvSpPr>
+            <a:spLocks noGrp="1"/>
+          </p:cNvSpPr>
+          <p:nvPr>
+            <p:ph idx="1"/>
+          </p:nvPr>
+        </p:nvSpPr>
+        <p:spPr/>
+        <p:txBody>
+          <a:bodyPr/>
+          <a:lstStyle/>
+          <a:p>
+            <a:r>
+              <a:rPr lang="it-IT" dirty="0" smtClean="0"/>
+              <a:t>Concomitanza stretta di esami e impegni</a:t>
+            </a:r>
+          </a:p>
+          <a:p>
+            <a:r>
+              <a:rPr lang="it-IT" dirty="0" smtClean="0"/>
+              <a:t>JSP &amp; SQL</a:t>
+            </a:r>
+          </a:p>
+          <a:p>
+            <a:r>
+              <a:rPr lang="it-IT" dirty="0" smtClean="0"/>
+              <a:t>Log e Porte chiuse</a:t>
+            </a:r>
+            <a:endParaRPr lang="it-IT" dirty="0"/>
+          </a:p>
+        </p:txBody>
+      </p:sp>
+      <p:sp>
+        <p:nvSpPr>
+          <p:cNvPr id="4" name="Segnaposto data 3"/>
+          <p:cNvSpPr>
+            <a:spLocks noGrp="1"/>
+          </p:cNvSpPr>
+          <p:nvPr>
+            <p:ph type="dt" sz="half" idx="10"/>
+          </p:nvPr>
+        </p:nvSpPr>
+        <p:spPr/>
+        <p:txBody>
+          <a:bodyPr/>
+          <a:lstStyle/>
+          <a:p>
+            <a:r>
+              <a:rPr lang="it-IT" smtClean="0"/>
+              <a:t>Progetto Gamification - Team Committed</a:t>
+            </a:r>
+            <a:endParaRPr lang="it-IT"/>
+          </a:p>
+        </p:txBody>
+      </p:sp>
+      <p:sp>
+        <p:nvSpPr>
+          <p:cNvPr id="7" name="Segnaposto numero diapositiva 4"/>
+          <p:cNvSpPr>
+            <a:spLocks noGrp="1"/>
+          </p:cNvSpPr>
+          <p:nvPr>
+            <p:ph type="sldNum" sz="quarter" idx="12"/>
+          </p:nvPr>
+        </p:nvSpPr>
+        <p:spPr>
+          <a:xfrm>
+            <a:off x="4649096" y="224491"/>
+            <a:ext cx="1332156" cy="365125"/>
+          </a:xfrm>
+        </p:spPr>
+        <p:txBody>
+          <a:bodyPr/>
+          <a:lstStyle/>
+          <a:p>
+            <a:fld id="{017EC607-BD11-4D4E-AC5F-155C854A0B9D}" type="slidenum">
+              <a:rPr lang="it-IT" smtClean="0"/>
+              <a:pPr/>
+              <a:t>8</a:t>
+            </a:fld>
+            <a:r>
+              <a:rPr lang="it-IT" dirty="0" smtClean="0"/>
+              <a:t> di </a:t>
+            </a:r>
+            <a:r>
+              <a:rPr lang="it-IT" dirty="0" smtClean="0"/>
+              <a:t>11</a:t>
+            </a:r>
+            <a:endParaRPr lang="it-IT" dirty="0" smtClean="0"/>
+          </a:p>
+        </p:txBody>
+      </p:sp>
+    </p:spTree>
+    <p:extLst>
+      <p:ext uri="{BB962C8B-B14F-4D97-AF65-F5344CB8AC3E}">
+        <p14:creationId xmlns:p14="http://schemas.microsoft.com/office/powerpoint/2010/main" val="3499007682"/>
+      </p:ext>
+    </p:extLst>
+  </p:cSld>
+  <p:clrMapOvr>
+    <a:masterClrMapping/>
+  </p:clrMapOvr>
+</p:sld>
+</file>
+
+<file path=ppt/slides/slide9.xml><?xml version="1.0" encoding="utf-8"?>
 <p:sld xmlns:a="http://schemas.openxmlformats.org/drawingml/2006/main" xmlns:r="http://schemas.openxmlformats.org/officeDocument/2006/relationships" xmlns:p="http://schemas.openxmlformats.org/presentationml/2006/main">
   <p:cSld>
     <p:spTree>
@@ -16345,12 +16810,17 @@
             <a:fld id="{017EC607-BD11-4D4E-AC5F-155C854A0B9D}" type="slidenum">
               <a:rPr lang="it-IT" smtClean="0"/>
               <a:pPr/>
-              <a:t>8</a:t>
+              <a:t>9</a:t>
             </a:fld>
             <a:r>
               <a:rPr lang="it-IT" dirty="0" smtClean="0"/>
-              <a:t> di 8</a:t>
+              <a:t> di </a:t>
             </a:r>
+            <a:r>
+              <a:rPr lang="it-IT" dirty="0" smtClean="0"/>
+              <a:t>11</a:t>
+            </a:r>
+            <a:endParaRPr lang="it-IT" dirty="0" smtClean="0"/>
           </a:p>
         </p:txBody>
       </p:sp>
@@ -16364,145 +16834,13 @@
   <p:clrMapOvr>
     <a:masterClrMapping/>
   </p:clrMapOvr>
-</p:sld>
-</file>
-
-<file path=ppt/slides/slide9.xml><?xml version="1.0" encoding="utf-8"?>
-<p:sld xmlns:a="http://schemas.openxmlformats.org/drawingml/2006/main" xmlns:r="http://schemas.openxmlformats.org/officeDocument/2006/relationships" xmlns:p="http://schemas.openxmlformats.org/presentationml/2006/main">
-  <p:cSld>
-    <p:spTree>
-      <p:nvGrpSpPr>
-        <p:cNvPr id="1" name=""/>
-        <p:cNvGrpSpPr/>
-        <p:nvPr/>
-      </p:nvGrpSpPr>
-      <p:grpSpPr>
-        <a:xfrm>
-          <a:off x="0" y="0"/>
-          <a:ext cx="0" cy="0"/>
-          <a:chOff x="0" y="0"/>
-          <a:chExt cx="0" cy="0"/>
-        </a:xfrm>
-      </p:grpSpPr>
-      <p:pic>
-        <p:nvPicPr>
-          <p:cNvPr id="7" name="Immagine 6"/>
-          <p:cNvPicPr>
-            <a:picLocks noChangeAspect="1"/>
-          </p:cNvPicPr>
-          <p:nvPr/>
-        </p:nvPicPr>
-        <p:blipFill>
-          <a:blip r:embed="rId2" cstate="print">
-            <a:extLst>
-              <a:ext uri="{28A0092B-C50C-407E-A947-70E740481C1C}">
-                <a14:useLocalDpi xmlns:a14="http://schemas.microsoft.com/office/drawing/2010/main" val="0"/>
-              </a:ext>
-            </a:extLst>
-          </a:blip>
-          <a:stretch>
-            <a:fillRect/>
-          </a:stretch>
-        </p:blipFill>
-        <p:spPr>
-          <a:xfrm>
-            <a:off x="2750630" y="1268760"/>
-            <a:ext cx="3765586" cy="4581128"/>
-          </a:xfrm>
-          <a:prstGeom prst="rect">
-            <a:avLst/>
-          </a:prstGeom>
-        </p:spPr>
-      </p:pic>
-      <p:sp>
-        <p:nvSpPr>
-          <p:cNvPr id="4" name="Segnaposto data 3"/>
-          <p:cNvSpPr>
-            <a:spLocks noGrp="1"/>
-          </p:cNvSpPr>
-          <p:nvPr>
-            <p:ph type="dt" sz="half" idx="10"/>
-          </p:nvPr>
-        </p:nvSpPr>
-        <p:spPr/>
-        <p:txBody>
-          <a:bodyPr/>
-          <a:lstStyle/>
-          <a:p>
-            <a:r>
-              <a:rPr lang="it-IT" smtClean="0"/>
-              <a:t>Progetto Gamification - Team Committed</a:t>
-            </a:r>
-            <a:endParaRPr lang="it-IT"/>
-          </a:p>
-        </p:txBody>
-      </p:sp>
-      <p:graphicFrame>
-        <p:nvGraphicFramePr>
-          <p:cNvPr id="6" name="Grafico 5"/>
-          <p:cNvGraphicFramePr>
-            <a:graphicFrameLocks/>
-          </p:cNvGraphicFramePr>
-          <p:nvPr>
-            <p:extLst>
-              <p:ext uri="{D42A27DB-BD31-4B8C-83A1-F6EECF244321}">
-                <p14:modId xmlns:p14="http://schemas.microsoft.com/office/powerpoint/2010/main" val="2096230454"/>
-              </p:ext>
-            </p:extLst>
-          </p:nvPr>
-        </p:nvGraphicFramePr>
-        <p:xfrm>
-          <a:off x="755576" y="1844824"/>
-          <a:ext cx="7704856" cy="3384376"/>
-        </p:xfrm>
-        <a:graphic>
-          <a:graphicData uri="http://schemas.openxmlformats.org/drawingml/2006/chart">
-            <c:chart xmlns:c="http://schemas.openxmlformats.org/drawingml/2006/chart" xmlns:r="http://schemas.openxmlformats.org/officeDocument/2006/relationships" r:id="rId3"/>
-          </a:graphicData>
-        </a:graphic>
-      </p:graphicFrame>
-      <p:sp>
-        <p:nvSpPr>
-          <p:cNvPr id="8" name="Segnaposto numero diapositiva 4"/>
-          <p:cNvSpPr>
-            <a:spLocks noGrp="1"/>
-          </p:cNvSpPr>
-          <p:nvPr>
-            <p:ph type="sldNum" sz="quarter" idx="12"/>
-          </p:nvPr>
-        </p:nvSpPr>
-        <p:spPr>
-          <a:xfrm>
-            <a:off x="4649096" y="224491"/>
-            <a:ext cx="1332156" cy="365125"/>
-          </a:xfrm>
-        </p:spPr>
-        <p:txBody>
-          <a:bodyPr/>
-          <a:lstStyle/>
-          <a:p>
-            <a:fld id="{017EC607-BD11-4D4E-AC5F-155C854A0B9D}" type="slidenum">
-              <a:rPr lang="it-IT" smtClean="0"/>
-              <a:pPr/>
-              <a:t>9</a:t>
-            </a:fld>
-            <a:r>
-              <a:rPr lang="it-IT" dirty="0" smtClean="0"/>
-              <a:t> di 8</a:t>
-            </a:r>
-          </a:p>
-        </p:txBody>
-      </p:sp>
-    </p:spTree>
-    <p:extLst>
-      <p:ext uri="{BB962C8B-B14F-4D97-AF65-F5344CB8AC3E}">
-        <p14:creationId xmlns:p14="http://schemas.microsoft.com/office/powerpoint/2010/main" val="639624037"/>
-      </p:ext>
-    </p:extLst>
-  </p:cSld>
-  <p:clrMapOvr>
-    <a:masterClrMapping/>
-  </p:clrMapOvr>
+  <p:timing>
+    <p:tnLst>
+      <p:par>
+        <p:cTn id="1" dur="indefinite" restart="never" nodeType="tmRoot"/>
+      </p:par>
+    </p:tnLst>
+  </p:timing>
 </p:sld>
 </file>
 

</xml_diff>

<commit_message>
[Presentazione RQ] Inserita la presentazione
</commit_message>
<xml_diff>
--- a/RQ/Esterni/Presentazione/RQ-Presentazione.pptx
+++ b/RQ/Esterni/Presentazione/RQ-Presentazione.pptx
@@ -199,7 +199,7 @@
           </c:tx>
           <c:spPr>
             <a:solidFill>
-              <a:schemeClr val="accent1"/>
+              <a:schemeClr val="accent4"/>
             </a:solidFill>
           </c:spPr>
           <c:invertIfNegative val="0"/>
@@ -214,7 +214,7 @@
           </c:dLbls>
           <c:cat>
             <c:strRef>
-              <c:f>Consuntivo_2_PA!$O$2:$O$6</c:f>
+              <c:f>'3_PDC'!$O$26:$O$30</c:f>
               <c:strCache>
                 <c:ptCount val="5"/>
                 <c:pt idx="0">
@@ -224,13 +224,13 @@
                   <c:v>Amministratore</c:v>
                 </c:pt>
                 <c:pt idx="2">
-                  <c:v>Analista</c:v>
+                  <c:v>Verificatore</c:v>
                 </c:pt>
                 <c:pt idx="3">
-                  <c:v>Verificatore</c:v>
+                  <c:v>Progettista</c:v>
                 </c:pt>
                 <c:pt idx="4">
-                  <c:v>Progettista</c:v>
+                  <c:v>Programmatore</c:v>
                 </c:pt>
               </c:strCache>
             </c:strRef>
@@ -268,7 +268,7 @@
           </c:tx>
           <c:spPr>
             <a:solidFill>
-              <a:schemeClr val="accent2"/>
+              <a:schemeClr val="accent1"/>
             </a:solidFill>
           </c:spPr>
           <c:invertIfNegative val="0"/>
@@ -283,7 +283,7 @@
           </c:dLbls>
           <c:cat>
             <c:strRef>
-              <c:f>Consuntivo_2_PA!$O$2:$O$6</c:f>
+              <c:f>'3_PDC'!$O$26:$O$30</c:f>
               <c:strCache>
                 <c:ptCount val="5"/>
                 <c:pt idx="0">
@@ -293,13 +293,13 @@
                   <c:v>Amministratore</c:v>
                 </c:pt>
                 <c:pt idx="2">
-                  <c:v>Analista</c:v>
+                  <c:v>Verificatore</c:v>
                 </c:pt>
                 <c:pt idx="3">
-                  <c:v>Verificatore</c:v>
+                  <c:v>Progettista</c:v>
                 </c:pt>
                 <c:pt idx="4">
-                  <c:v>Progettista</c:v>
+                  <c:v>Programmatore</c:v>
                 </c:pt>
               </c:strCache>
             </c:strRef>
@@ -339,12 +339,12 @@
         </c:dLbls>
         <c:gapWidth val="150"/>
         <c:shape val="box"/>
-        <c:axId val="113336320"/>
-        <c:axId val="113337856"/>
+        <c:axId val="112807936"/>
+        <c:axId val="112809472"/>
         <c:axId val="0"/>
       </c:bar3DChart>
       <c:catAx>
-        <c:axId val="113336320"/>
+        <c:axId val="112807936"/>
         <c:scaling>
           <c:orientation val="minMax"/>
         </c:scaling>
@@ -353,7 +353,7 @@
         <c:majorTickMark val="out"/>
         <c:minorTickMark val="none"/>
         <c:tickLblPos val="nextTo"/>
-        <c:crossAx val="113337856"/>
+        <c:crossAx val="112809472"/>
         <c:crosses val="autoZero"/>
         <c:auto val="1"/>
         <c:lblAlgn val="ctr"/>
@@ -361,7 +361,7 @@
         <c:noMultiLvlLbl val="0"/>
       </c:catAx>
       <c:valAx>
-        <c:axId val="113337856"/>
+        <c:axId val="112809472"/>
         <c:scaling>
           <c:orientation val="minMax"/>
         </c:scaling>
@@ -372,7 +372,7 @@
         <c:majorTickMark val="out"/>
         <c:minorTickMark val="none"/>
         <c:tickLblPos val="nextTo"/>
-        <c:crossAx val="113336320"/>
+        <c:crossAx val="112807936"/>
         <c:crosses val="autoZero"/>
         <c:crossBetween val="between"/>
       </c:valAx>
@@ -561,12 +561,12 @@
         </c:dLbls>
         <c:gapWidth val="150"/>
         <c:shape val="box"/>
-        <c:axId val="115217152"/>
-        <c:axId val="115218688"/>
+        <c:axId val="114033408"/>
+        <c:axId val="114034944"/>
         <c:axId val="0"/>
       </c:bar3DChart>
       <c:catAx>
-        <c:axId val="115217152"/>
+        <c:axId val="114033408"/>
         <c:scaling>
           <c:orientation val="minMax"/>
         </c:scaling>
@@ -575,7 +575,7 @@
         <c:majorTickMark val="out"/>
         <c:minorTickMark val="none"/>
         <c:tickLblPos val="nextTo"/>
-        <c:crossAx val="115218688"/>
+        <c:crossAx val="114034944"/>
         <c:crosses val="autoZero"/>
         <c:auto val="1"/>
         <c:lblAlgn val="ctr"/>
@@ -583,7 +583,7 @@
         <c:noMultiLvlLbl val="0"/>
       </c:catAx>
       <c:valAx>
-        <c:axId val="115218688"/>
+        <c:axId val="114034944"/>
         <c:scaling>
           <c:orientation val="minMax"/>
           <c:min val="0"/>
@@ -595,7 +595,7 @@
         <c:majorTickMark val="out"/>
         <c:minorTickMark val="none"/>
         <c:tickLblPos val="nextTo"/>
-        <c:crossAx val="115217152"/>
+        <c:crossAx val="114033408"/>
         <c:crosses val="autoZero"/>
         <c:crossBetween val="between"/>
       </c:valAx>
@@ -730,7 +730,7 @@
             <a:fld id="{6B71E980-16C9-4DBF-B0BF-5D16F9726465}" type="datetimeFigureOut">
               <a:rPr lang="it-IT" smtClean="0"/>
               <a:pPr/>
-              <a:t>20/06/2012</a:t>
+              <a:t>21/06/2012</a:t>
             </a:fld>
             <a:endParaRPr lang="it-IT"/>
           </a:p>
@@ -15005,13 +15005,8 @@
             </a:fld>
             <a:r>
               <a:rPr lang="it-IT" dirty="0" smtClean="0"/>
-              <a:t> di </a:t>
+              <a:t> di 11</a:t>
             </a:r>
-            <a:r>
-              <a:rPr lang="it-IT" dirty="0" smtClean="0"/>
-              <a:t>11</a:t>
-            </a:r>
-            <a:endParaRPr lang="it-IT" dirty="0" smtClean="0"/>
           </a:p>
         </p:txBody>
       </p:sp>
@@ -15161,13 +15156,8 @@
             </a:fld>
             <a:r>
               <a:rPr lang="it-IT" dirty="0" smtClean="0"/>
-              <a:t> di </a:t>
+              <a:t> di 11</a:t>
             </a:r>
-            <a:r>
-              <a:rPr lang="it-IT" dirty="0" smtClean="0"/>
-              <a:t>11</a:t>
-            </a:r>
-            <a:endParaRPr lang="it-IT" dirty="0" smtClean="0"/>
           </a:p>
         </p:txBody>
       </p:sp>
@@ -15361,13 +15351,8 @@
             </a:fld>
             <a:r>
               <a:rPr lang="it-IT" dirty="0" smtClean="0"/>
-              <a:t> di </a:t>
+              <a:t> di 11</a:t>
             </a:r>
-            <a:r>
-              <a:rPr lang="it-IT" dirty="0" smtClean="0"/>
-              <a:t>11</a:t>
-            </a:r>
-            <a:endParaRPr lang="it-IT" dirty="0" smtClean="0"/>
           </a:p>
         </p:txBody>
       </p:sp>
@@ -15540,13 +15525,8 @@
             </a:fld>
             <a:r>
               <a:rPr lang="it-IT" dirty="0" smtClean="0"/>
-              <a:t> di </a:t>
+              <a:t> di 11</a:t>
             </a:r>
-            <a:r>
-              <a:rPr lang="it-IT" dirty="0" smtClean="0"/>
-              <a:t>11</a:t>
-            </a:r>
-            <a:endParaRPr lang="it-IT" dirty="0" smtClean="0"/>
           </a:p>
         </p:txBody>
       </p:sp>
@@ -15661,15 +15641,7 @@
           <a:p>
             <a:r>
               <a:rPr lang="it-IT" dirty="0" smtClean="0"/>
-              <a:t>Design </a:t>
-            </a:r>
-            <a:r>
-              <a:rPr lang="it-IT" dirty="0" smtClean="0"/>
-              <a:t>Pattern e stili </a:t>
-            </a:r>
-            <a:r>
-              <a:rPr lang="it-IT" dirty="0" smtClean="0"/>
-              <a:t>architetturali</a:t>
+              <a:t>Design Pattern e stili architetturali</a:t>
             </a:r>
           </a:p>
           <a:p>
@@ -15798,13 +15770,8 @@
             </a:fld>
             <a:r>
               <a:rPr lang="it-IT" dirty="0" smtClean="0"/>
-              <a:t> di </a:t>
+              <a:t> di 11</a:t>
             </a:r>
-            <a:r>
-              <a:rPr lang="it-IT" dirty="0" smtClean="0"/>
-              <a:t>11</a:t>
-            </a:r>
-            <a:endParaRPr lang="it-IT" dirty="0" smtClean="0"/>
           </a:p>
         </p:txBody>
       </p:sp>
@@ -15933,6 +15900,16 @@
               <a:t>Test di integrazione</a:t>
             </a:r>
           </a:p>
+          <a:p>
+            <a:pPr lvl="1"/>
+            <a:r>
+              <a:rPr lang="it-IT" dirty="0" smtClean="0"/>
+              <a:t>Test di regressione</a:t>
+            </a:r>
+          </a:p>
+          <a:p>
+            <a:endParaRPr lang="it-IT" dirty="0" smtClean="0"/>
+          </a:p>
         </p:txBody>
       </p:sp>
       <p:sp>
@@ -15985,13 +15962,8 @@
             </a:fld>
             <a:r>
               <a:rPr lang="it-IT" dirty="0" smtClean="0"/>
-              <a:t> di </a:t>
+              <a:t> di 11</a:t>
             </a:r>
-            <a:r>
-              <a:rPr lang="it-IT" dirty="0" smtClean="0"/>
-              <a:t>11</a:t>
-            </a:r>
-            <a:endParaRPr lang="it-IT" dirty="0" smtClean="0"/>
           </a:p>
         </p:txBody>
       </p:sp>
@@ -16074,7 +16046,7 @@
           <a:p>
             <a:r>
               <a:rPr lang="it-IT" dirty="0" smtClean="0"/>
-              <a:t>Esempio di test</a:t>
+              <a:t>Esempio di analisi</a:t>
             </a:r>
             <a:endParaRPr lang="it-IT" dirty="0"/>
           </a:p>
@@ -16103,7 +16075,7 @@
             </a:pPr>
             <a:r>
               <a:rPr lang="it-IT" dirty="0" smtClean="0"/>
-              <a:t>Test statici</a:t>
+              <a:t>Analisi statica</a:t>
             </a:r>
           </a:p>
           <a:p>
@@ -16183,13 +16155,8 @@
             </a:fld>
             <a:r>
               <a:rPr lang="it-IT" dirty="0" smtClean="0"/>
-              <a:t> di </a:t>
+              <a:t> di 11</a:t>
             </a:r>
-            <a:r>
-              <a:rPr lang="it-IT" dirty="0" smtClean="0"/>
-              <a:t>11</a:t>
-            </a:r>
-            <a:endParaRPr lang="it-IT" dirty="0" smtClean="0"/>
           </a:p>
         </p:txBody>
       </p:sp>
@@ -16363,12 +16330,8 @@
               <a:buAutoNum type="arabicPeriod"/>
             </a:pPr>
             <a:r>
-              <a:rPr lang="it-IT" dirty="0"/>
-              <a:t>Test </a:t>
-            </a:r>
-            <a:r>
               <a:rPr lang="it-IT" dirty="0" smtClean="0"/>
-              <a:t>dinamici</a:t>
+              <a:t>Analisi dinamica</a:t>
             </a:r>
           </a:p>
           <a:p>
@@ -16585,8 +16548,13 @@
           <a:p>
             <a:r>
               <a:rPr lang="it-IT" dirty="0" smtClean="0"/>
-              <a:t>JSP &amp; SQL</a:t>
+              <a:t>JSP &amp; </a:t>
             </a:r>
+            <a:r>
+              <a:rPr lang="it-IT" smtClean="0"/>
+              <a:t>MySQL</a:t>
+            </a:r>
+            <a:endParaRPr lang="it-IT" dirty="0" smtClean="0"/>
           </a:p>
           <a:p>
             <a:r>
@@ -16647,13 +16615,8 @@
             </a:fld>
             <a:r>
               <a:rPr lang="it-IT" dirty="0" smtClean="0"/>
-              <a:t> di </a:t>
+              <a:t> di 11</a:t>
             </a:r>
-            <a:r>
-              <a:rPr lang="it-IT" dirty="0" smtClean="0"/>
-              <a:t>11</a:t>
-            </a:r>
-            <a:endParaRPr lang="it-IT" dirty="0" smtClean="0"/>
           </a:p>
         </p:txBody>
       </p:sp>
@@ -16763,30 +16726,6 @@
           </a:p>
         </p:txBody>
       </p:sp>
-      <p:graphicFrame>
-        <p:nvGraphicFramePr>
-          <p:cNvPr id="8" name="Grafico 7"/>
-          <p:cNvGraphicFramePr>
-            <a:graphicFrameLocks/>
-          </p:cNvGraphicFramePr>
-          <p:nvPr>
-            <p:extLst>
-              <p:ext uri="{D42A27DB-BD31-4B8C-83A1-F6EECF244321}">
-                <p14:modId xmlns:p14="http://schemas.microsoft.com/office/powerpoint/2010/main" val="1858659039"/>
-              </p:ext>
-            </p:extLst>
-          </p:nvPr>
-        </p:nvGraphicFramePr>
-        <p:xfrm>
-          <a:off x="827584" y="2132856"/>
-          <a:ext cx="7560840" cy="4032448"/>
-        </p:xfrm>
-        <a:graphic>
-          <a:graphicData uri="http://schemas.openxmlformats.org/drawingml/2006/chart">
-            <c:chart xmlns:c="http://schemas.openxmlformats.org/drawingml/2006/chart" xmlns:r="http://schemas.openxmlformats.org/officeDocument/2006/relationships" r:id="rId3"/>
-          </a:graphicData>
-        </a:graphic>
-      </p:graphicFrame>
       <p:sp>
         <p:nvSpPr>
           <p:cNvPr id="10" name="Segnaposto numero diapositiva 4"/>
@@ -16814,16 +16753,35 @@
             </a:fld>
             <a:r>
               <a:rPr lang="it-IT" dirty="0" smtClean="0"/>
-              <a:t> di </a:t>
+              <a:t> di 11</a:t>
             </a:r>
-            <a:r>
-              <a:rPr lang="it-IT" dirty="0" smtClean="0"/>
-              <a:t>11</a:t>
-            </a:r>
-            <a:endParaRPr lang="it-IT" dirty="0" smtClean="0"/>
           </a:p>
         </p:txBody>
       </p:sp>
+      <p:graphicFrame>
+        <p:nvGraphicFramePr>
+          <p:cNvPr id="7" name="Grafico 6"/>
+          <p:cNvGraphicFramePr>
+            <a:graphicFrameLocks/>
+          </p:cNvGraphicFramePr>
+          <p:nvPr>
+            <p:extLst>
+              <p:ext uri="{D42A27DB-BD31-4B8C-83A1-F6EECF244321}">
+                <p14:modId xmlns:p14="http://schemas.microsoft.com/office/powerpoint/2010/main" val="953707691"/>
+              </p:ext>
+            </p:extLst>
+          </p:nvPr>
+        </p:nvGraphicFramePr>
+        <p:xfrm>
+          <a:off x="827584" y="2248211"/>
+          <a:ext cx="7488832" cy="3845085"/>
+        </p:xfrm>
+        <a:graphic>
+          <a:graphicData uri="http://schemas.openxmlformats.org/drawingml/2006/chart">
+            <c:chart xmlns:c="http://schemas.openxmlformats.org/drawingml/2006/chart" xmlns:r="http://schemas.openxmlformats.org/officeDocument/2006/relationships" r:id="rId3"/>
+          </a:graphicData>
+        </a:graphic>
+      </p:graphicFrame>
     </p:spTree>
     <p:extLst>
       <p:ext uri="{BB962C8B-B14F-4D97-AF65-F5344CB8AC3E}">

</xml_diff>